<commit_message>
Replaced wait by sleep to aFvoid wasting walltime when waiting; fixed host migration issue
</commit_message>
<xml_diff>
--- a/LinuxTools/Checkpointing/checkpointing.pptx
+++ b/LinuxTools/Checkpointing/checkpointing.pptx
@@ -217,7 +217,7 @@
           <a:p>
             <a:fld id="{6E701E40-F6BA-46ED-B660-6F2F89D811A2}" type="datetimeFigureOut">
               <a:rPr lang="nl-BE" smtClean="0"/>
-              <a:t>10/01/2017</a:t>
+              <a:t>2017-01-11</a:t>
             </a:fld>
             <a:endParaRPr lang="nl-BE"/>
           </a:p>
@@ -700,7 +700,7 @@
           <a:p>
             <a:fld id="{A287BB98-A89C-4C03-80F2-740225F5832C}" type="datetime1">
               <a:rPr lang="nl-BE" smtClean="0"/>
-              <a:t>10/01/2017</a:t>
+              <a:t>2017-01-11</a:t>
             </a:fld>
             <a:endParaRPr lang="nl-BE"/>
           </a:p>
@@ -870,7 +870,7 @@
           <a:p>
             <a:fld id="{737C6972-E9CE-4E73-AF9E-95B5E586C978}" type="datetime1">
               <a:rPr lang="nl-BE" smtClean="0"/>
-              <a:t>10/01/2017</a:t>
+              <a:t>2017-01-11</a:t>
             </a:fld>
             <a:endParaRPr lang="nl-BE"/>
           </a:p>
@@ -1050,7 +1050,7 @@
           <a:p>
             <a:fld id="{E76A7134-DD41-4476-8EAA-3B730437DDBA}" type="datetime1">
               <a:rPr lang="nl-BE" smtClean="0"/>
-              <a:t>10/01/2017</a:t>
+              <a:t>2017-01-11</a:t>
             </a:fld>
             <a:endParaRPr lang="nl-BE"/>
           </a:p>
@@ -1220,7 +1220,7 @@
           <a:p>
             <a:fld id="{6A712DDC-5823-4684-B9AB-13238133037F}" type="datetime1">
               <a:rPr lang="nl-BE" smtClean="0"/>
-              <a:t>10/01/2017</a:t>
+              <a:t>2017-01-11</a:t>
             </a:fld>
             <a:endParaRPr lang="nl-BE"/>
           </a:p>
@@ -1466,7 +1466,7 @@
           <a:p>
             <a:fld id="{25C98E6C-43F2-48C1-A878-60E399ADAF2F}" type="datetime1">
               <a:rPr lang="nl-BE" smtClean="0"/>
-              <a:t>10/01/2017</a:t>
+              <a:t>2017-01-11</a:t>
             </a:fld>
             <a:endParaRPr lang="nl-BE"/>
           </a:p>
@@ -1698,7 +1698,7 @@
           <a:p>
             <a:fld id="{68842D03-A048-445C-9971-C2AB088B80A8}" type="datetime1">
               <a:rPr lang="nl-BE" smtClean="0"/>
-              <a:t>10/01/2017</a:t>
+              <a:t>2017-01-11</a:t>
             </a:fld>
             <a:endParaRPr lang="nl-BE"/>
           </a:p>
@@ -2065,7 +2065,7 @@
           <a:p>
             <a:fld id="{0ABF26F5-8313-46CF-9E1C-E4A5B1A405D5}" type="datetime1">
               <a:rPr lang="nl-BE" smtClean="0"/>
-              <a:t>10/01/2017</a:t>
+              <a:t>2017-01-11</a:t>
             </a:fld>
             <a:endParaRPr lang="nl-BE"/>
           </a:p>
@@ -2183,7 +2183,7 @@
           <a:p>
             <a:fld id="{3CD87042-D51F-46CD-A77A-D047938A78D4}" type="datetime1">
               <a:rPr lang="nl-BE" smtClean="0"/>
-              <a:t>10/01/2017</a:t>
+              <a:t>2017-01-11</a:t>
             </a:fld>
             <a:endParaRPr lang="nl-BE"/>
           </a:p>
@@ -2278,7 +2278,7 @@
           <a:p>
             <a:fld id="{DC7432F5-E9F5-4C1F-9A3F-E7415A274E50}" type="datetime1">
               <a:rPr lang="nl-BE" smtClean="0"/>
-              <a:t>10/01/2017</a:t>
+              <a:t>2017-01-11</a:t>
             </a:fld>
             <a:endParaRPr lang="nl-BE"/>
           </a:p>
@@ -2555,7 +2555,7 @@
           <a:p>
             <a:fld id="{A8E1E92E-52FD-4A10-B7BB-621FA570F8E7}" type="datetime1">
               <a:rPr lang="nl-BE" smtClean="0"/>
-              <a:t>10/01/2017</a:t>
+              <a:t>2017-01-11</a:t>
             </a:fld>
             <a:endParaRPr lang="nl-BE"/>
           </a:p>
@@ -2808,7 +2808,7 @@
           <a:p>
             <a:fld id="{7D9E8458-F8C2-496F-A560-F1929A927ED8}" type="datetime1">
               <a:rPr lang="nl-BE" smtClean="0"/>
-              <a:t>10/01/2017</a:t>
+              <a:t>2017-01-11</a:t>
             </a:fld>
             <a:endParaRPr lang="nl-BE"/>
           </a:p>
@@ -3021,7 +3021,7 @@
           <a:p>
             <a:fld id="{ABA2E406-D30D-4CBF-B51D-3D815C4F7FD2}" type="datetime1">
               <a:rPr lang="nl-BE" smtClean="0"/>
-              <a:t>10/01/2017</a:t>
+              <a:t>2017-01-11</a:t>
             </a:fld>
             <a:endParaRPr lang="nl-BE"/>
           </a:p>
@@ -3696,35 +3696,7 @@
                 <a:latin typeface="Courier New" panose="02070309020205020404" pitchFamily="49" charset="0"/>
                 <a:cs typeface="Courier New" panose="02070309020205020404" pitchFamily="49" charset="0"/>
               </a:rPr>
-              <a:t>dmtcp_launch  </a:t>
-            </a:r>
-            <a:r>
-              <a:rPr lang="nl-BE" dirty="0" smtClean="0">
-                <a:latin typeface="Courier New" panose="02070309020205020404" pitchFamily="49" charset="0"/>
-                <a:cs typeface="Courier New" panose="02070309020205020404" pitchFamily="49" charset="0"/>
-              </a:rPr>
-              <a:t>./</a:t>
-            </a:r>
-            <a:r>
-              <a:rPr lang="nl-BE" dirty="0" smtClean="0">
-                <a:latin typeface="Courier New" panose="02070309020205020404" pitchFamily="49" charset="0"/>
-                <a:cs typeface="Courier New" panose="02070309020205020404" pitchFamily="49" charset="0"/>
-              </a:rPr>
-              <a:t>compute</a:t>
-            </a:r>
-            <a:r>
-              <a:rPr lang="nl-BE" dirty="0" smtClean="0">
-                <a:latin typeface="Courier New" panose="02070309020205020404" pitchFamily="49" charset="0"/>
-                <a:cs typeface="Courier New" panose="02070309020205020404" pitchFamily="49" charset="0"/>
-              </a:rPr>
-              <a:t>.exe  out.txt  </a:t>
-            </a:r>
-            <a:r>
-              <a:rPr lang="nl-BE" dirty="0" smtClean="0">
-                <a:latin typeface="Courier New" panose="02070309020205020404" pitchFamily="49" charset="0"/>
-                <a:cs typeface="Courier New" panose="02070309020205020404" pitchFamily="49" charset="0"/>
-              </a:rPr>
-              <a:t>$(( 12*60*100 ))  1</a:t>
+              <a:t>dmtcp_launch  ./compute.exe  out.txt  $(( 12*60*100 ))  1</a:t>
             </a:r>
             <a:endParaRPr lang="nl-BE" dirty="0">
               <a:latin typeface="Courier New" panose="02070309020205020404" pitchFamily="49" charset="0"/>
@@ -3765,11 +3737,25 @@
           <a:lstStyle/>
           <a:p>
             <a:r>
-              <a:rPr lang="nl-BE" dirty="0" err="1" smtClean="0">
-                <a:latin typeface="Courier New" panose="02070309020205020404" pitchFamily="49" charset="0"/>
-                <a:cs typeface="Courier New" panose="02070309020205020404" pitchFamily="49" charset="0"/>
-              </a:rPr>
-              <a:t>wait</a:t>
+              <a:rPr lang="nl-BE" dirty="0">
+                <a:latin typeface="Courier New" panose="02070309020205020404" pitchFamily="49" charset="0"/>
+                <a:cs typeface="Courier New" panose="02070309020205020404" pitchFamily="49" charset="0"/>
+              </a:rPr>
+              <a:t>s</a:t>
+            </a:r>
+            <a:r>
+              <a:rPr lang="nl-BE" dirty="0" smtClean="0">
+                <a:latin typeface="Courier New" panose="02070309020205020404" pitchFamily="49" charset="0"/>
+                <a:cs typeface="Courier New" panose="02070309020205020404" pitchFamily="49" charset="0"/>
+              </a:rPr>
+              <a:t>leep </a:t>
+            </a:r>
+            <a:r>
+              <a:rPr lang="nl-BE" dirty="0" smtClean="0">
+                <a:latin typeface="Courier New" panose="02070309020205020404" pitchFamily="49" charset="0"/>
+                <a:cs typeface="Courier New" panose="02070309020205020404" pitchFamily="49" charset="0"/>
+              </a:rPr>
+              <a:t>5</a:t>
             </a:r>
             <a:endParaRPr lang="nl-BE" dirty="0">
               <a:latin typeface="Courier New" panose="02070309020205020404" pitchFamily="49" charset="0"/>
@@ -3786,10 +3772,10 @@
         </p:nvGrpSpPr>
         <p:grpSpPr>
           <a:xfrm>
-            <a:off x="1193249" y="4278705"/>
-            <a:ext cx="6492611" cy="1157320"/>
+            <a:off x="1452037" y="4304583"/>
+            <a:ext cx="6909520" cy="1157320"/>
             <a:chOff x="810883" y="3974290"/>
-            <a:chExt cx="6492611" cy="1157320"/>
+            <a:chExt cx="6909520" cy="1157320"/>
           </a:xfrm>
         </p:grpSpPr>
         <p:sp>
@@ -3801,7 +3787,7 @@
           <p:spPr>
             <a:xfrm>
               <a:off x="810883" y="4762278"/>
-              <a:ext cx="6492611" cy="369332"/>
+              <a:ext cx="6909520" cy="369332"/>
             </a:xfrm>
             <a:prstGeom prst="rect">
               <a:avLst/>
@@ -3821,7 +3807,7 @@
             <a:p>
               <a:r>
                 <a:rPr lang="en-US" dirty="0" smtClean="0"/>
-                <a:t>ensure daemon (in background) quits before terminating PBS script</a:t>
+                <a:t>give daemon (in background) time to quit before terminating PBS script</a:t>
               </a:r>
               <a:endParaRPr lang="nl-BE" dirty="0">
                 <a:latin typeface="Courier New" panose="02070309020205020404" pitchFamily="49" charset="0"/>
@@ -3840,8 +3826,8 @@
           </p:nvCxnSpPr>
           <p:spPr>
             <a:xfrm flipH="1" flipV="1">
-              <a:off x="1101418" y="3974290"/>
-              <a:ext cx="2955771" cy="787988"/>
+              <a:off x="1101425" y="3974290"/>
+              <a:ext cx="3164218" cy="787988"/>
             </a:xfrm>
             <a:prstGeom prst="straightConnector1">
               <a:avLst/>
@@ -4410,6 +4396,13 @@
             </a:r>
           </a:p>
           <a:p>
+            <a:r>
+              <a:rPr lang="en-US" dirty="0" smtClean="0">
+                <a:latin typeface="Courier New" panose="02070309020205020404" pitchFamily="49" charset="0"/>
+                <a:cs typeface="Courier New" panose="02070309020205020404" pitchFamily="49" charset="0"/>
+              </a:rPr>
+              <a:t>export DMTCP_COORD_HOST=$(hostname)</a:t>
+            </a:r>
             <a:endParaRPr lang="en-US" dirty="0" smtClean="0">
               <a:latin typeface="Courier New" panose="02070309020205020404" pitchFamily="49" charset="0"/>
               <a:cs typeface="Courier New" panose="02070309020205020404" pitchFamily="49" charset="0"/>
@@ -4428,8 +4421,26 @@
                 <a:latin typeface="Courier New" panose="02070309020205020404" pitchFamily="49" charset="0"/>
                 <a:cs typeface="Courier New" panose="02070309020205020404" pitchFamily="49" charset="0"/>
               </a:rPr>
-              <a:t> &amp;</a:t>
-            </a:r>
+              <a:t> </a:t>
+            </a:r>
+            <a:r>
+              <a:rPr lang="en-US" dirty="0" smtClean="0">
+                <a:latin typeface="Courier New" panose="02070309020205020404" pitchFamily="49" charset="0"/>
+                <a:cs typeface="Courier New" panose="02070309020205020404" pitchFamily="49" charset="0"/>
+              </a:rPr>
+              <a:t>--</a:t>
+            </a:r>
+            <a:r>
+              <a:rPr lang="en-US" dirty="0" smtClean="0">
+                <a:latin typeface="Courier New" panose="02070309020205020404" pitchFamily="49" charset="0"/>
+                <a:cs typeface="Courier New" panose="02070309020205020404" pitchFamily="49" charset="0"/>
+              </a:rPr>
+              <a:t>exit-on-last &amp;</a:t>
+            </a:r>
+            <a:endParaRPr lang="en-US" dirty="0" smtClean="0">
+              <a:latin typeface="Courier New" panose="02070309020205020404" pitchFamily="49" charset="0"/>
+              <a:cs typeface="Courier New" panose="02070309020205020404" pitchFamily="49" charset="0"/>
+            </a:endParaRPr>
           </a:p>
           <a:p>
             <a:r>
@@ -4457,21 +4468,7 @@
                 <a:latin typeface="Courier New" panose="02070309020205020404" pitchFamily="49" charset="0"/>
                 <a:cs typeface="Courier New" panose="02070309020205020404" pitchFamily="49" charset="0"/>
               </a:rPr>
-              <a:t>mtcp_launch  </a:t>
-            </a:r>
-            <a:r>
-              <a:rPr lang="nl-BE" dirty="0" smtClean="0">
-                <a:latin typeface="Courier New" panose="02070309020205020404" pitchFamily="49" charset="0"/>
-                <a:cs typeface="Courier New" panose="02070309020205020404" pitchFamily="49" charset="0"/>
-              </a:rPr>
-              <a:t>./compute.exe  out.txt  </a:t>
-            </a:r>
-            <a:r>
-              <a:rPr lang="nl-BE" dirty="0" smtClean="0">
-                <a:latin typeface="Courier New" panose="02070309020205020404" pitchFamily="49" charset="0"/>
-                <a:cs typeface="Courier New" panose="02070309020205020404" pitchFamily="49" charset="0"/>
-              </a:rPr>
-              <a:t>$(( 12*60*100 ))  1</a:t>
+              <a:t>mtcp_launch  ./compute.exe  out.txt  $(( 12*60*100 ))  1</a:t>
             </a:r>
           </a:p>
           <a:p>
@@ -4482,11 +4479,25 @@
           </a:p>
           <a:p>
             <a:r>
+              <a:rPr lang="en-US" dirty="0">
+                <a:latin typeface="Courier New" panose="02070309020205020404" pitchFamily="49" charset="0"/>
+                <a:cs typeface="Courier New" panose="02070309020205020404" pitchFamily="49" charset="0"/>
+              </a:rPr>
+              <a:t>s</a:t>
+            </a:r>
+            <a:r>
               <a:rPr lang="en-US" dirty="0" smtClean="0">
                 <a:latin typeface="Courier New" panose="02070309020205020404" pitchFamily="49" charset="0"/>
                 <a:cs typeface="Courier New" panose="02070309020205020404" pitchFamily="49" charset="0"/>
               </a:rPr>
-              <a:t>wait</a:t>
+              <a:t>leep </a:t>
+            </a:r>
+            <a:r>
+              <a:rPr lang="en-US" dirty="0" smtClean="0">
+                <a:latin typeface="Courier New" panose="02070309020205020404" pitchFamily="49" charset="0"/>
+                <a:cs typeface="Courier New" panose="02070309020205020404" pitchFamily="49" charset="0"/>
+              </a:rPr>
+              <a:t>5</a:t>
             </a:r>
             <a:endParaRPr lang="nl-BE" dirty="0">
               <a:latin typeface="Courier New" panose="02070309020205020404" pitchFamily="49" charset="0"/>
@@ -5424,7 +5435,7 @@
         <p:spPr>
           <a:xfrm>
             <a:off x="628649" y="1690689"/>
-            <a:ext cx="6574407" cy="3416320"/>
+            <a:ext cx="6574407" cy="3693319"/>
           </a:xfrm>
           <a:prstGeom prst="rect">
             <a:avLst/>
@@ -5641,6 +5652,22 @@
                 <a:cs typeface="Courier New" panose="02070309020205020404" pitchFamily="49" charset="0"/>
               </a:rPr>
               <a:t>))</a:t>
+            </a:r>
+          </a:p>
+          <a:p>
+            <a:r>
+              <a:rPr lang="en-US" dirty="0">
+                <a:latin typeface="Courier New" panose="02070309020205020404" pitchFamily="49" charset="0"/>
+                <a:cs typeface="Courier New" panose="02070309020205020404" pitchFamily="49" charset="0"/>
+              </a:rPr>
+              <a:t>e</a:t>
+            </a:r>
+            <a:r>
+              <a:rPr lang="en-US" dirty="0" smtClean="0">
+                <a:latin typeface="Courier New" panose="02070309020205020404" pitchFamily="49" charset="0"/>
+                <a:cs typeface="Courier New" panose="02070309020205020404" pitchFamily="49" charset="0"/>
+              </a:rPr>
+              <a:t>xport DMTCP_COORD_HOST=$(hostname)</a:t>
             </a:r>
           </a:p>
           <a:p>
@@ -7677,21 +7704,7 @@
                 <a:latin typeface="Courier New" panose="02070309020205020404" pitchFamily="49" charset="0"/>
                 <a:cs typeface="Courier New" panose="02070309020205020404" pitchFamily="49" charset="0"/>
               </a:rPr>
-              <a:t>./producer.exe  </a:t>
-            </a:r>
-            <a:r>
-              <a:rPr lang="en-US" dirty="0" smtClean="0">
-                <a:latin typeface="Courier New" panose="02070309020205020404" pitchFamily="49" charset="0"/>
-                <a:cs typeface="Courier New" panose="02070309020205020404" pitchFamily="49" charset="0"/>
-              </a:rPr>
-              <a:t>|  </a:t>
-            </a:r>
-            <a:r>
-              <a:rPr lang="en-US" dirty="0" smtClean="0">
-                <a:latin typeface="Courier New" panose="02070309020205020404" pitchFamily="49" charset="0"/>
-                <a:cs typeface="Courier New" panose="02070309020205020404" pitchFamily="49" charset="0"/>
-              </a:rPr>
-              <a:t>consumer.exe  &gt;  out.txt</a:t>
+              <a:t>./producer.exe  |  consumer.exe  &gt;  out.txt</a:t>
             </a:r>
             <a:endParaRPr lang="nl-BE" dirty="0">
               <a:latin typeface="Courier New" panose="02070309020205020404" pitchFamily="49" charset="0"/>
@@ -8013,6 +8026,13 @@
             </a:r>
           </a:p>
           <a:p>
+            <a:r>
+              <a:rPr lang="en-US" dirty="0" smtClean="0">
+                <a:latin typeface="Courier New" panose="02070309020205020404" pitchFamily="49" charset="0"/>
+                <a:cs typeface="Courier New" panose="02070309020205020404" pitchFamily="49" charset="0"/>
+              </a:rPr>
+              <a:t>export DMTCP_COORD_HOST=$(hostname)</a:t>
+            </a:r>
             <a:endParaRPr lang="en-US" dirty="0" smtClean="0">
               <a:latin typeface="Courier New" panose="02070309020205020404" pitchFamily="49" charset="0"/>
               <a:cs typeface="Courier New" panose="02070309020205020404" pitchFamily="49" charset="0"/>
@@ -8031,7 +8051,14 @@
                 <a:latin typeface="Courier New" panose="02070309020205020404" pitchFamily="49" charset="0"/>
                 <a:cs typeface="Courier New" panose="02070309020205020404" pitchFamily="49" charset="0"/>
               </a:rPr>
-              <a:t> &amp;</a:t>
+              <a:t> --exit-on-last </a:t>
+            </a:r>
+            <a:r>
+              <a:rPr lang="en-US" dirty="0" smtClean="0">
+                <a:latin typeface="Courier New" panose="02070309020205020404" pitchFamily="49" charset="0"/>
+                <a:cs typeface="Courier New" panose="02070309020205020404" pitchFamily="49" charset="0"/>
+              </a:rPr>
+              <a:t>&amp;</a:t>
             </a:r>
           </a:p>
           <a:p>
@@ -8078,11 +8105,25 @@
           </a:p>
           <a:p>
             <a:r>
+              <a:rPr lang="en-US" dirty="0">
+                <a:latin typeface="Courier New" panose="02070309020205020404" pitchFamily="49" charset="0"/>
+                <a:cs typeface="Courier New" panose="02070309020205020404" pitchFamily="49" charset="0"/>
+              </a:rPr>
+              <a:t>s</a:t>
+            </a:r>
+            <a:r>
               <a:rPr lang="en-US" dirty="0" smtClean="0">
                 <a:latin typeface="Courier New" panose="02070309020205020404" pitchFamily="49" charset="0"/>
                 <a:cs typeface="Courier New" panose="02070309020205020404" pitchFamily="49" charset="0"/>
               </a:rPr>
-              <a:t>wait</a:t>
+              <a:t>leep </a:t>
+            </a:r>
+            <a:r>
+              <a:rPr lang="en-US" dirty="0" smtClean="0">
+                <a:latin typeface="Courier New" panose="02070309020205020404" pitchFamily="49" charset="0"/>
+                <a:cs typeface="Courier New" panose="02070309020205020404" pitchFamily="49" charset="0"/>
+              </a:rPr>
+              <a:t>5</a:t>
             </a:r>
             <a:endParaRPr lang="nl-BE" dirty="0">
               <a:latin typeface="Courier New" panose="02070309020205020404" pitchFamily="49" charset="0"/>
@@ -10007,28 +10048,7 @@
                 <a:latin typeface="Courier New" panose="02070309020205020404" pitchFamily="49" charset="0"/>
                 <a:cs typeface="Courier New" panose="02070309020205020404" pitchFamily="49" charset="0"/>
               </a:rPr>
-              <a:t>./</a:t>
-            </a:r>
-            <a:r>
-              <a:rPr lang="nl-BE" dirty="0" smtClean="0">
-                <a:latin typeface="Courier New" panose="02070309020205020404" pitchFamily="49" charset="0"/>
-                <a:cs typeface="Courier New" panose="02070309020205020404" pitchFamily="49" charset="0"/>
-              </a:rPr>
-              <a:t>compute</a:t>
-            </a:r>
-            <a:r>
-              <a:rPr lang="nl-BE" dirty="0" smtClean="0">
-                <a:latin typeface="Courier New" panose="02070309020205020404" pitchFamily="49" charset="0"/>
-                <a:cs typeface="Courier New" panose="02070309020205020404" pitchFamily="49" charset="0"/>
-              </a:rPr>
-              <a:t>.exe  out.txt  </a:t>
-            </a:r>
-            <a:r>
-              <a:rPr lang="nl-BE" dirty="0" smtClean="0">
-                <a:latin typeface="Courier New" panose="02070309020205020404" pitchFamily="49" charset="0"/>
-                <a:cs typeface="Courier New" panose="02070309020205020404" pitchFamily="49" charset="0"/>
-              </a:rPr>
-              <a:t>$(( 12*60*100 ))  1</a:t>
+              <a:t>./compute.exe  out.txt  $(( 12*60*100 ))  1</a:t>
             </a:r>
             <a:endParaRPr lang="nl-BE" dirty="0">
               <a:latin typeface="Courier New" panose="02070309020205020404" pitchFamily="49" charset="0"/>
@@ -10179,11 +10199,7 @@
             </a:r>
             <a:r>
               <a:rPr lang="en-US" sz="2000" dirty="0" smtClean="0"/>
-              <a:t> </a:t>
-            </a:r>
-            <a:r>
-              <a:rPr lang="en-US" sz="2000" dirty="0" smtClean="0"/>
-              <a:t>is unmodified, no libraries/instrumentation required</a:t>
+              <a:t> is unmodified, no libraries/instrumentation required</a:t>
             </a:r>
             <a:endParaRPr lang="nl-BE" sz="1600" dirty="0"/>
           </a:p>
@@ -10416,17 +10432,35 @@
             <a:endParaRPr lang="en-US" dirty="0"/>
           </a:p>
           <a:p>
+            <a:pPr marL="0" indent="0">
+              <a:buNone/>
+            </a:pPr>
+            <a:endParaRPr lang="en-US" dirty="0"/>
+          </a:p>
+          <a:p>
+            <a:r>
+              <a:rPr lang="en-US" dirty="0" smtClean="0"/>
+              <a:t>How often to checkpoint</a:t>
+            </a:r>
+            <a:r>
+              <a:rPr lang="en-US" dirty="0" smtClean="0"/>
+              <a:t>?</a:t>
+            </a:r>
+          </a:p>
+          <a:p>
+            <a:endParaRPr lang="en-US" dirty="0"/>
+          </a:p>
+          <a:p>
+            <a:r>
+              <a:rPr lang="en-US" dirty="0" smtClean="0"/>
+              <a:t>Coordinator host</a:t>
+            </a:r>
+          </a:p>
+          <a:p>
+            <a:endParaRPr lang="en-US" dirty="0"/>
+          </a:p>
+          <a:p>
             <a:endParaRPr lang="en-US" dirty="0" smtClean="0"/>
-          </a:p>
-          <a:p>
-            <a:endParaRPr lang="en-US" dirty="0"/>
-          </a:p>
-          <a:p>
-            <a:r>
-              <a:rPr lang="en-US" dirty="0" smtClean="0"/>
-              <a:t>How often to checkpoint?</a:t>
-            </a:r>
-            <a:endParaRPr lang="nl-BE" dirty="0"/>
           </a:p>
         </p:txBody>
       </p:sp>
@@ -10530,7 +10564,7 @@
         </p:nvSpPr>
         <p:spPr>
           <a:xfrm>
-            <a:off x="988082" y="4465519"/>
+            <a:off x="992811" y="3883173"/>
             <a:ext cx="6574407" cy="369332"/>
           </a:xfrm>
           <a:prstGeom prst="rect">
@@ -10571,10 +10605,10 @@
         </p:nvGrpSpPr>
         <p:grpSpPr>
           <a:xfrm>
-            <a:off x="4373581" y="2875085"/>
-            <a:ext cx="3839000" cy="815913"/>
-            <a:chOff x="810883" y="4315697"/>
-            <a:chExt cx="3839000" cy="815913"/>
+            <a:off x="4873913" y="2785198"/>
+            <a:ext cx="3925030" cy="815912"/>
+            <a:chOff x="1311215" y="4225810"/>
+            <a:chExt cx="3925030" cy="815912"/>
           </a:xfrm>
         </p:grpSpPr>
         <p:sp>
@@ -10585,8 +10619,8 @@
           </p:nvSpPr>
           <p:spPr>
             <a:xfrm>
-              <a:off x="810883" y="4762278"/>
-              <a:ext cx="3839000" cy="369332"/>
+              <a:off x="1311215" y="4672390"/>
+              <a:ext cx="3925030" cy="369332"/>
             </a:xfrm>
             <a:prstGeom prst="rect">
               <a:avLst/>
@@ -10599,7 +10633,7 @@
             </a:ln>
           </p:spPr>
           <p:txBody>
-            <a:bodyPr wrap="none" rtlCol="0">
+            <a:bodyPr wrap="square" rtlCol="0">
               <a:spAutoFit/>
             </a:bodyPr>
             <a:lstStyle/>
@@ -10636,8 +10670,8 @@
           </p:nvCxnSpPr>
           <p:spPr>
             <a:xfrm flipH="1" flipV="1">
-              <a:off x="2389694" y="4315697"/>
-              <a:ext cx="340689" cy="446581"/>
+              <a:off x="2890028" y="4225810"/>
+              <a:ext cx="383702" cy="446580"/>
             </a:xfrm>
             <a:prstGeom prst="straightConnector1">
               <a:avLst/>
@@ -10673,10 +10707,10 @@
         </p:nvGrpSpPr>
         <p:grpSpPr>
           <a:xfrm>
-            <a:off x="4373581" y="4903901"/>
-            <a:ext cx="2539157" cy="815912"/>
-            <a:chOff x="810883" y="4315698"/>
-            <a:chExt cx="2539157" cy="815912"/>
+            <a:off x="6259786" y="4252505"/>
+            <a:ext cx="2539157" cy="482446"/>
+            <a:chOff x="810883" y="4649164"/>
+            <a:chExt cx="2539157" cy="482446"/>
           </a:xfrm>
         </p:grpSpPr>
         <p:sp>
@@ -10726,9 +10760,9 @@
             <p:nvPr/>
           </p:nvCxnSpPr>
           <p:spPr>
-            <a:xfrm flipV="1">
-              <a:off x="2080462" y="4315698"/>
-              <a:ext cx="309242" cy="446580"/>
+            <a:xfrm flipH="1" flipV="1">
+              <a:off x="1667889" y="4649164"/>
+              <a:ext cx="412573" cy="113114"/>
             </a:xfrm>
             <a:prstGeom prst="straightConnector1">
               <a:avLst/>
@@ -10814,6 +10848,163 @@
           </a:p>
         </p:txBody>
       </p:sp>
+      <p:sp>
+        <p:nvSpPr>
+          <p:cNvPr id="17" name="Rectangle 16"/>
+          <p:cNvSpPr/>
+          <p:nvPr/>
+        </p:nvSpPr>
+        <p:spPr>
+          <a:xfrm>
+            <a:off x="988082" y="4940968"/>
+            <a:ext cx="6574407" cy="369332"/>
+          </a:xfrm>
+          <a:prstGeom prst="rect">
+            <a:avLst/>
+          </a:prstGeom>
+          <a:solidFill>
+            <a:schemeClr val="bg1">
+              <a:lumMod val="85000"/>
+            </a:schemeClr>
+          </a:solidFill>
+          <a:ln>
+            <a:solidFill>
+              <a:schemeClr val="tx1"/>
+            </a:solidFill>
+          </a:ln>
+        </p:spPr>
+        <p:txBody>
+          <a:bodyPr wrap="square">
+            <a:spAutoFit/>
+          </a:bodyPr>
+          <a:lstStyle/>
+          <a:p>
+            <a:r>
+              <a:rPr lang="nl-BE" dirty="0" smtClean="0">
+                <a:latin typeface="Courier New" panose="02070309020205020404" pitchFamily="49" charset="0"/>
+                <a:cs typeface="Courier New" panose="02070309020205020404" pitchFamily="49" charset="0"/>
+              </a:rPr>
+              <a:t>export </a:t>
+            </a:r>
+            <a:r>
+              <a:rPr lang="nl-BE" dirty="0" smtClean="0">
+                <a:latin typeface="Courier New" panose="02070309020205020404" pitchFamily="49" charset="0"/>
+                <a:cs typeface="Courier New" panose="02070309020205020404" pitchFamily="49" charset="0"/>
+              </a:rPr>
+              <a:t>DMTCP_COORD_HOST=$(</a:t>
+            </a:r>
+            <a:r>
+              <a:rPr lang="nl-BE" dirty="0" err="1" smtClean="0">
+                <a:latin typeface="Courier New" panose="02070309020205020404" pitchFamily="49" charset="0"/>
+                <a:cs typeface="Courier New" panose="02070309020205020404" pitchFamily="49" charset="0"/>
+              </a:rPr>
+              <a:t>hostname</a:t>
+            </a:r>
+            <a:r>
+              <a:rPr lang="nl-BE" dirty="0" smtClean="0">
+                <a:latin typeface="Courier New" panose="02070309020205020404" pitchFamily="49" charset="0"/>
+                <a:cs typeface="Courier New" panose="02070309020205020404" pitchFamily="49" charset="0"/>
+              </a:rPr>
+              <a:t>)</a:t>
+            </a:r>
+            <a:endParaRPr lang="nl-BE" dirty="0" smtClean="0">
+              <a:latin typeface="Courier New" panose="02070309020205020404" pitchFamily="49" charset="0"/>
+              <a:cs typeface="Courier New" panose="02070309020205020404" pitchFamily="49" charset="0"/>
+            </a:endParaRPr>
+          </a:p>
+        </p:txBody>
+      </p:sp>
+      <p:grpSp>
+        <p:nvGrpSpPr>
+          <p:cNvPr id="19" name="Group 18"/>
+          <p:cNvGrpSpPr/>
+          <p:nvPr/>
+        </p:nvGrpSpPr>
+        <p:grpSpPr>
+          <a:xfrm>
+            <a:off x="5935672" y="5142199"/>
+            <a:ext cx="2037406" cy="672369"/>
+            <a:chOff x="506670" y="4206574"/>
+            <a:chExt cx="2037406" cy="672369"/>
+          </a:xfrm>
+        </p:grpSpPr>
+        <p:sp>
+          <p:nvSpPr>
+            <p:cNvPr id="20" name="TextBox 19"/>
+            <p:cNvSpPr txBox="1"/>
+            <p:nvPr/>
+          </p:nvSpPr>
+          <p:spPr>
+            <a:xfrm>
+              <a:off x="790263" y="4509611"/>
+              <a:ext cx="1753813" cy="369332"/>
+            </a:xfrm>
+            <a:prstGeom prst="rect">
+              <a:avLst/>
+            </a:prstGeom>
+            <a:noFill/>
+            <a:ln>
+              <a:solidFill>
+                <a:schemeClr val="tx1"/>
+              </a:solidFill>
+            </a:ln>
+          </p:spPr>
+          <p:txBody>
+            <a:bodyPr wrap="none" rtlCol="0">
+              <a:spAutoFit/>
+            </a:bodyPr>
+            <a:lstStyle/>
+            <a:p>
+              <a:r>
+                <a:rPr lang="en-US" dirty="0" smtClean="0"/>
+                <a:t>Allows migration</a:t>
+              </a:r>
+              <a:endParaRPr lang="nl-BE" dirty="0">
+                <a:latin typeface="Courier New" panose="02070309020205020404" pitchFamily="49" charset="0"/>
+                <a:cs typeface="Courier New" panose="02070309020205020404" pitchFamily="49" charset="0"/>
+              </a:endParaRPr>
+            </a:p>
+          </p:txBody>
+        </p:sp>
+        <p:cxnSp>
+          <p:nvCxnSpPr>
+            <p:cNvPr id="21" name="Straight Arrow Connector 20"/>
+            <p:cNvCxnSpPr>
+              <a:stCxn id="20" idx="0"/>
+            </p:cNvCxnSpPr>
+            <p:nvPr/>
+          </p:nvCxnSpPr>
+          <p:spPr>
+            <a:xfrm flipH="1" flipV="1">
+              <a:off x="506670" y="4206574"/>
+              <a:ext cx="1160500" cy="303037"/>
+            </a:xfrm>
+            <a:prstGeom prst="straightConnector1">
+              <a:avLst/>
+            </a:prstGeom>
+            <a:ln w="19050">
+              <a:solidFill>
+                <a:schemeClr val="tx1"/>
+              </a:solidFill>
+              <a:tailEnd type="stealth" w="lg" len="lg"/>
+            </a:ln>
+          </p:spPr>
+          <p:style>
+            <a:lnRef idx="1">
+              <a:schemeClr val="accent1"/>
+            </a:lnRef>
+            <a:fillRef idx="0">
+              <a:schemeClr val="accent1"/>
+            </a:fillRef>
+            <a:effectRef idx="0">
+              <a:schemeClr val="accent1"/>
+            </a:effectRef>
+            <a:fontRef idx="minor">
+              <a:schemeClr val="tx1"/>
+            </a:fontRef>
+          </p:style>
+        </p:cxnSp>
+      </p:grpSp>
     </p:spTree>
     <p:extLst>
       <p:ext uri="{BB962C8B-B14F-4D97-AF65-F5344CB8AC3E}">
@@ -10984,7 +11175,7 @@
                                         <p:tgtEl>
                                           <p:spTgt spid="4">
                                             <p:txEl>
-                                              <p:pRg st="4" end="4"/>
+                                              <p:pRg st="3" end="3"/>
                                             </p:txEl>
                                           </p:spTgt>
                                         </p:tgtEl>
@@ -11103,6 +11294,127 @@
                                           </p:stCondLst>
                                         </p:cTn>
                                         <p:tgtEl>
+                                          <p:spTgt spid="4">
+                                            <p:txEl>
+                                              <p:pRg st="5" end="5"/>
+                                            </p:txEl>
+                                          </p:spTgt>
+                                        </p:tgtEl>
+                                        <p:attrNameLst>
+                                          <p:attrName>style.visibility</p:attrName>
+                                        </p:attrNameLst>
+                                      </p:cBhvr>
+                                      <p:to>
+                                        <p:strVal val="visible"/>
+                                      </p:to>
+                                    </p:set>
+                                  </p:childTnLst>
+                                </p:cTn>
+                              </p:par>
+                              <p:par>
+                                <p:cTn id="27" presetID="1" presetClass="entr" presetSubtype="0" fill="hold" grpId="0" nodeType="withEffect">
+                                  <p:stCondLst>
+                                    <p:cond delay="0"/>
+                                  </p:stCondLst>
+                                  <p:childTnLst>
+                                    <p:set>
+                                      <p:cBhvr>
+                                        <p:cTn id="28" dur="1" fill="hold">
+                                          <p:stCondLst>
+                                            <p:cond delay="0"/>
+                                          </p:stCondLst>
+                                        </p:cTn>
+                                        <p:tgtEl>
+                                          <p:spTgt spid="17"/>
+                                        </p:tgtEl>
+                                        <p:attrNameLst>
+                                          <p:attrName>style.visibility</p:attrName>
+                                        </p:attrNameLst>
+                                      </p:cBhvr>
+                                      <p:to>
+                                        <p:strVal val="visible"/>
+                                      </p:to>
+                                    </p:set>
+                                  </p:childTnLst>
+                                </p:cTn>
+                              </p:par>
+                            </p:childTnLst>
+                          </p:cTn>
+                        </p:par>
+                      </p:childTnLst>
+                    </p:cTn>
+                  </p:par>
+                  <p:par>
+                    <p:cTn id="29" fill="hold">
+                      <p:stCondLst>
+                        <p:cond delay="indefinite"/>
+                      </p:stCondLst>
+                      <p:childTnLst>
+                        <p:par>
+                          <p:cTn id="30" fill="hold">
+                            <p:stCondLst>
+                              <p:cond delay="0"/>
+                            </p:stCondLst>
+                            <p:childTnLst>
+                              <p:par>
+                                <p:cTn id="31" presetID="1" presetClass="entr" presetSubtype="0" fill="hold" nodeType="clickEffect">
+                                  <p:stCondLst>
+                                    <p:cond delay="0"/>
+                                  </p:stCondLst>
+                                  <p:childTnLst>
+                                    <p:set>
+                                      <p:cBhvr>
+                                        <p:cTn id="32" dur="1" fill="hold">
+                                          <p:stCondLst>
+                                            <p:cond delay="0"/>
+                                          </p:stCondLst>
+                                        </p:cTn>
+                                        <p:tgtEl>
+                                          <p:spTgt spid="19"/>
+                                        </p:tgtEl>
+                                        <p:attrNameLst>
+                                          <p:attrName>style.visibility</p:attrName>
+                                        </p:attrNameLst>
+                                      </p:cBhvr>
+                                      <p:to>
+                                        <p:strVal val="visible"/>
+                                      </p:to>
+                                    </p:set>
+                                  </p:childTnLst>
+                                </p:cTn>
+                              </p:par>
+                            </p:childTnLst>
+                          </p:cTn>
+                        </p:par>
+                      </p:childTnLst>
+                    </p:cTn>
+                  </p:par>
+                  <p:par>
+                    <p:cTn id="33" fill="hold">
+                      <p:stCondLst>
+                        <p:cond delay="indefinite"/>
+                      </p:stCondLst>
+                      <p:childTnLst>
+                        <p:par>
+                          <p:cTn id="34" fill="hold">
+                            <p:stCondLst>
+                              <p:cond delay="0"/>
+                            </p:stCondLst>
+                            <p:childTnLst>
+                              <p:par>
+                                <p:cTn id="35" presetID="1" presetClass="entr" presetSubtype="0" fill="hold" grpId="0" nodeType="clickEffect">
+                                  <p:stCondLst>
+                                    <p:cond delay="0"/>
+                                  </p:stCondLst>
+                                  <p:childTnLst>
+                                    <p:set>
+                                      <p:cBhvr>
+                                        <p:cTn id="36" dur="1" fill="hold">
+                                          <p:stCondLst>
+                                            <p:cond delay="0"/>
+                                          </p:stCondLst>
+                                        </p:cTn>
+                                        <p:tgtEl>
                                           <p:spTgt spid="14"/>
                                         </p:tgtEl>
                                         <p:attrNameLst>
@@ -11148,6 +11460,7 @@
       <p:bldP spid="5" grpId="0" animBg="1"/>
       <p:bldP spid="6" grpId="0" animBg="1"/>
       <p:bldP spid="14" grpId="0" animBg="1"/>
+      <p:bldP spid="17" grpId="0" animBg="1"/>
     </p:bldLst>
   </p:timing>
 </p:sld>
@@ -11338,8 +11651,26 @@
                 <a:latin typeface="Courier New" panose="02070309020205020404" pitchFamily="49" charset="0"/>
                 <a:cs typeface="Courier New" panose="02070309020205020404" pitchFamily="49" charset="0"/>
               </a:rPr>
-              <a:t> &amp;</a:t>
-            </a:r>
+              <a:t> </a:t>
+            </a:r>
+            <a:r>
+              <a:rPr lang="nl-BE" dirty="0" smtClean="0">
+                <a:latin typeface="Courier New" panose="02070309020205020404" pitchFamily="49" charset="0"/>
+                <a:cs typeface="Courier New" panose="02070309020205020404" pitchFamily="49" charset="0"/>
+              </a:rPr>
+              <a:t>--</a:t>
+            </a:r>
+            <a:r>
+              <a:rPr lang="nl-BE" dirty="0" smtClean="0">
+                <a:latin typeface="Courier New" panose="02070309020205020404" pitchFamily="49" charset="0"/>
+                <a:cs typeface="Courier New" panose="02070309020205020404" pitchFamily="49" charset="0"/>
+              </a:rPr>
+              <a:t>exit-on-last &amp;</a:t>
+            </a:r>
+            <a:endParaRPr lang="nl-BE" dirty="0">
+              <a:latin typeface="Courier New" panose="02070309020205020404" pitchFamily="49" charset="0"/>
+              <a:cs typeface="Courier New" panose="02070309020205020404" pitchFamily="49" charset="0"/>
+            </a:endParaRPr>
           </a:p>
           <a:p>
             <a:r>
@@ -11364,7 +11695,7 @@
         </p:nvGrpSpPr>
         <p:grpSpPr>
           <a:xfrm>
-            <a:off x="3645850" y="4226943"/>
+            <a:off x="3956400" y="4295951"/>
             <a:ext cx="2867580" cy="906531"/>
             <a:chOff x="810883" y="4225079"/>
             <a:chExt cx="2867580" cy="906531"/>

</xml_diff>

<commit_message>
Replace sleep with safer wait
</commit_message>
<xml_diff>
--- a/LinuxTools/Checkpointing/checkpointing.pptx
+++ b/LinuxTools/Checkpointing/checkpointing.pptx
@@ -3737,25 +3737,11 @@
           <a:lstStyle/>
           <a:p>
             <a:r>
-              <a:rPr lang="nl-BE" dirty="0">
-                <a:latin typeface="Courier New" panose="02070309020205020404" pitchFamily="49" charset="0"/>
-                <a:cs typeface="Courier New" panose="02070309020205020404" pitchFamily="49" charset="0"/>
-              </a:rPr>
-              <a:t>s</a:t>
-            </a:r>
-            <a:r>
-              <a:rPr lang="nl-BE" dirty="0" smtClean="0">
-                <a:latin typeface="Courier New" panose="02070309020205020404" pitchFamily="49" charset="0"/>
-                <a:cs typeface="Courier New" panose="02070309020205020404" pitchFamily="49" charset="0"/>
-              </a:rPr>
-              <a:t>leep </a:t>
-            </a:r>
-            <a:r>
-              <a:rPr lang="nl-BE" dirty="0" smtClean="0">
-                <a:latin typeface="Courier New" panose="02070309020205020404" pitchFamily="49" charset="0"/>
-                <a:cs typeface="Courier New" panose="02070309020205020404" pitchFamily="49" charset="0"/>
-              </a:rPr>
-              <a:t>5</a:t>
+              <a:rPr lang="nl-BE" dirty="0" err="1" smtClean="0">
+                <a:latin typeface="Courier New" panose="02070309020205020404" pitchFamily="49" charset="0"/>
+                <a:cs typeface="Courier New" panose="02070309020205020404" pitchFamily="49" charset="0"/>
+              </a:rPr>
+              <a:t>wait</a:t>
             </a:r>
             <a:endParaRPr lang="nl-BE" dirty="0">
               <a:latin typeface="Courier New" panose="02070309020205020404" pitchFamily="49" charset="0"/>
@@ -4479,25 +4465,11 @@
           </a:p>
           <a:p>
             <a:r>
-              <a:rPr lang="en-US" dirty="0">
-                <a:latin typeface="Courier New" panose="02070309020205020404" pitchFamily="49" charset="0"/>
-                <a:cs typeface="Courier New" panose="02070309020205020404" pitchFamily="49" charset="0"/>
-              </a:rPr>
-              <a:t>s</a:t>
-            </a:r>
-            <a:r>
               <a:rPr lang="en-US" dirty="0" smtClean="0">
                 <a:latin typeface="Courier New" panose="02070309020205020404" pitchFamily="49" charset="0"/>
                 <a:cs typeface="Courier New" panose="02070309020205020404" pitchFamily="49" charset="0"/>
               </a:rPr>
-              <a:t>leep </a:t>
-            </a:r>
-            <a:r>
-              <a:rPr lang="en-US" dirty="0" smtClean="0">
-                <a:latin typeface="Courier New" panose="02070309020205020404" pitchFamily="49" charset="0"/>
-                <a:cs typeface="Courier New" panose="02070309020205020404" pitchFamily="49" charset="0"/>
-              </a:rPr>
-              <a:t>5</a:t>
+              <a:t>wait</a:t>
             </a:r>
             <a:endParaRPr lang="nl-BE" dirty="0">
               <a:latin typeface="Courier New" panose="02070309020205020404" pitchFamily="49" charset="0"/>
@@ -8105,25 +8077,11 @@
           </a:p>
           <a:p>
             <a:r>
-              <a:rPr lang="en-US" dirty="0">
-                <a:latin typeface="Courier New" panose="02070309020205020404" pitchFamily="49" charset="0"/>
-                <a:cs typeface="Courier New" panose="02070309020205020404" pitchFamily="49" charset="0"/>
-              </a:rPr>
-              <a:t>s</a:t>
-            </a:r>
-            <a:r>
               <a:rPr lang="en-US" dirty="0" smtClean="0">
                 <a:latin typeface="Courier New" panose="02070309020205020404" pitchFamily="49" charset="0"/>
                 <a:cs typeface="Courier New" panose="02070309020205020404" pitchFamily="49" charset="0"/>
               </a:rPr>
-              <a:t>leep </a:t>
-            </a:r>
-            <a:r>
-              <a:rPr lang="en-US" dirty="0" smtClean="0">
-                <a:latin typeface="Courier New" panose="02070309020205020404" pitchFamily="49" charset="0"/>
-                <a:cs typeface="Courier New" panose="02070309020205020404" pitchFamily="49" charset="0"/>
-              </a:rPr>
-              <a:t>5</a:t>
+              <a:t>wait</a:t>
             </a:r>
             <a:endParaRPr lang="nl-BE" dirty="0">
               <a:latin typeface="Courier New" panose="02070309020205020404" pitchFamily="49" charset="0"/>

</xml_diff>

<commit_message>
Added slide on checkpointing single node MPI + OpenMP applications
</commit_message>
<xml_diff>
--- a/LinuxTools/Checkpointing/checkpointing.pptx
+++ b/LinuxTools/Checkpointing/checkpointing.pptx
@@ -5,7 +5,7 @@
     <p:sldMasterId id="2147483648" r:id="rId1"/>
   </p:sldMasterIdLst>
   <p:notesMasterIdLst>
-    <p:notesMasterId r:id="rId23"/>
+    <p:notesMasterId r:id="rId25"/>
   </p:notesMasterIdLst>
   <p:sldIdLst>
     <p:sldId id="256" r:id="rId2"/>
@@ -27,8 +27,10 @@
     <p:sldId id="272" r:id="rId18"/>
     <p:sldId id="273" r:id="rId19"/>
     <p:sldId id="274" r:id="rId20"/>
-    <p:sldId id="275" r:id="rId21"/>
-    <p:sldId id="276" r:id="rId22"/>
+    <p:sldId id="277" r:id="rId21"/>
+    <p:sldId id="278" r:id="rId22"/>
+    <p:sldId id="275" r:id="rId23"/>
+    <p:sldId id="276" r:id="rId24"/>
   </p:sldIdLst>
   <p:sldSz cx="9144000" cy="6858000" type="screen4x3"/>
   <p:notesSz cx="6858000" cy="9144000"/>
@@ -217,7 +219,7 @@
           <a:p>
             <a:fld id="{6E701E40-F6BA-46ED-B660-6F2F89D811A2}" type="datetimeFigureOut">
               <a:rPr lang="nl-BE" smtClean="0"/>
-              <a:t>2017-01-11</a:t>
+              <a:t>2017-01-18</a:t>
             </a:fld>
             <a:endParaRPr lang="nl-BE"/>
           </a:p>
@@ -700,7 +702,7 @@
           <a:p>
             <a:fld id="{A287BB98-A89C-4C03-80F2-740225F5832C}" type="datetime1">
               <a:rPr lang="nl-BE" smtClean="0"/>
-              <a:t>2017-01-11</a:t>
+              <a:t>2017-01-18</a:t>
             </a:fld>
             <a:endParaRPr lang="nl-BE"/>
           </a:p>
@@ -870,7 +872,7 @@
           <a:p>
             <a:fld id="{737C6972-E9CE-4E73-AF9E-95B5E586C978}" type="datetime1">
               <a:rPr lang="nl-BE" smtClean="0"/>
-              <a:t>2017-01-11</a:t>
+              <a:t>2017-01-18</a:t>
             </a:fld>
             <a:endParaRPr lang="nl-BE"/>
           </a:p>
@@ -1050,7 +1052,7 @@
           <a:p>
             <a:fld id="{E76A7134-DD41-4476-8EAA-3B730437DDBA}" type="datetime1">
               <a:rPr lang="nl-BE" smtClean="0"/>
-              <a:t>2017-01-11</a:t>
+              <a:t>2017-01-18</a:t>
             </a:fld>
             <a:endParaRPr lang="nl-BE"/>
           </a:p>
@@ -1220,7 +1222,7 @@
           <a:p>
             <a:fld id="{6A712DDC-5823-4684-B9AB-13238133037F}" type="datetime1">
               <a:rPr lang="nl-BE" smtClean="0"/>
-              <a:t>2017-01-11</a:t>
+              <a:t>2017-01-18</a:t>
             </a:fld>
             <a:endParaRPr lang="nl-BE"/>
           </a:p>
@@ -1466,7 +1468,7 @@
           <a:p>
             <a:fld id="{25C98E6C-43F2-48C1-A878-60E399ADAF2F}" type="datetime1">
               <a:rPr lang="nl-BE" smtClean="0"/>
-              <a:t>2017-01-11</a:t>
+              <a:t>2017-01-18</a:t>
             </a:fld>
             <a:endParaRPr lang="nl-BE"/>
           </a:p>
@@ -1698,7 +1700,7 @@
           <a:p>
             <a:fld id="{68842D03-A048-445C-9971-C2AB088B80A8}" type="datetime1">
               <a:rPr lang="nl-BE" smtClean="0"/>
-              <a:t>2017-01-11</a:t>
+              <a:t>2017-01-18</a:t>
             </a:fld>
             <a:endParaRPr lang="nl-BE"/>
           </a:p>
@@ -2065,7 +2067,7 @@
           <a:p>
             <a:fld id="{0ABF26F5-8313-46CF-9E1C-E4A5B1A405D5}" type="datetime1">
               <a:rPr lang="nl-BE" smtClean="0"/>
-              <a:t>2017-01-11</a:t>
+              <a:t>2017-01-18</a:t>
             </a:fld>
             <a:endParaRPr lang="nl-BE"/>
           </a:p>
@@ -2183,7 +2185,7 @@
           <a:p>
             <a:fld id="{3CD87042-D51F-46CD-A77A-D047938A78D4}" type="datetime1">
               <a:rPr lang="nl-BE" smtClean="0"/>
-              <a:t>2017-01-11</a:t>
+              <a:t>2017-01-18</a:t>
             </a:fld>
             <a:endParaRPr lang="nl-BE"/>
           </a:p>
@@ -2278,7 +2280,7 @@
           <a:p>
             <a:fld id="{DC7432F5-E9F5-4C1F-9A3F-E7415A274E50}" type="datetime1">
               <a:rPr lang="nl-BE" smtClean="0"/>
-              <a:t>2017-01-11</a:t>
+              <a:t>2017-01-18</a:t>
             </a:fld>
             <a:endParaRPr lang="nl-BE"/>
           </a:p>
@@ -2555,7 +2557,7 @@
           <a:p>
             <a:fld id="{A8E1E92E-52FD-4A10-B7BB-621FA570F8E7}" type="datetime1">
               <a:rPr lang="nl-BE" smtClean="0"/>
-              <a:t>2017-01-11</a:t>
+              <a:t>2017-01-18</a:t>
             </a:fld>
             <a:endParaRPr lang="nl-BE"/>
           </a:p>
@@ -2808,7 +2810,7 @@
           <a:p>
             <a:fld id="{7D9E8458-F8C2-496F-A560-F1929A927ED8}" type="datetime1">
               <a:rPr lang="nl-BE" smtClean="0"/>
-              <a:t>2017-01-11</a:t>
+              <a:t>2017-01-18</a:t>
             </a:fld>
             <a:endParaRPr lang="nl-BE"/>
           </a:p>
@@ -3021,7 +3023,7 @@
           <a:p>
             <a:fld id="{ABA2E406-D30D-4CBF-B51D-3D815C4F7FD2}" type="datetime1">
               <a:rPr lang="nl-BE" smtClean="0"/>
-              <a:t>2017-01-11</a:t>
+              <a:t>2017-01-18</a:t>
             </a:fld>
             <a:endParaRPr lang="nl-BE"/>
           </a:p>
@@ -4389,10 +4391,6 @@
               </a:rPr>
               <a:t>export DMTCP_COORD_HOST=$(hostname)</a:t>
             </a:r>
-            <a:endParaRPr lang="en-US" dirty="0" smtClean="0">
-              <a:latin typeface="Courier New" panose="02070309020205020404" pitchFamily="49" charset="0"/>
-              <a:cs typeface="Courier New" panose="02070309020205020404" pitchFamily="49" charset="0"/>
-            </a:endParaRPr>
           </a:p>
           <a:p>
             <a:r>
@@ -4407,26 +4405,8 @@
                 <a:latin typeface="Courier New" panose="02070309020205020404" pitchFamily="49" charset="0"/>
                 <a:cs typeface="Courier New" panose="02070309020205020404" pitchFamily="49" charset="0"/>
               </a:rPr>
-              <a:t> </a:t>
-            </a:r>
-            <a:r>
-              <a:rPr lang="en-US" dirty="0" smtClean="0">
-                <a:latin typeface="Courier New" panose="02070309020205020404" pitchFamily="49" charset="0"/>
-                <a:cs typeface="Courier New" panose="02070309020205020404" pitchFamily="49" charset="0"/>
-              </a:rPr>
-              <a:t>--</a:t>
-            </a:r>
-            <a:r>
-              <a:rPr lang="en-US" dirty="0" smtClean="0">
-                <a:latin typeface="Courier New" panose="02070309020205020404" pitchFamily="49" charset="0"/>
-                <a:cs typeface="Courier New" panose="02070309020205020404" pitchFamily="49" charset="0"/>
-              </a:rPr>
-              <a:t>exit-on-last &amp;</a:t>
-            </a:r>
-            <a:endParaRPr lang="en-US" dirty="0" smtClean="0">
-              <a:latin typeface="Courier New" panose="02070309020205020404" pitchFamily="49" charset="0"/>
-              <a:cs typeface="Courier New" panose="02070309020205020404" pitchFamily="49" charset="0"/>
-            </a:endParaRPr>
+              <a:t> --exit-on-last &amp;</a:t>
+            </a:r>
           </a:p>
           <a:p>
             <a:r>
@@ -8005,10 +7985,6 @@
               </a:rPr>
               <a:t>export DMTCP_COORD_HOST=$(hostname)</a:t>
             </a:r>
-            <a:endParaRPr lang="en-US" dirty="0" smtClean="0">
-              <a:latin typeface="Courier New" panose="02070309020205020404" pitchFamily="49" charset="0"/>
-              <a:cs typeface="Courier New" panose="02070309020205020404" pitchFamily="49" charset="0"/>
-            </a:endParaRPr>
           </a:p>
           <a:p>
             <a:r>
@@ -8023,14 +7999,7 @@
                 <a:latin typeface="Courier New" panose="02070309020205020404" pitchFamily="49" charset="0"/>
                 <a:cs typeface="Courier New" panose="02070309020205020404" pitchFamily="49" charset="0"/>
               </a:rPr>
-              <a:t> --exit-on-last </a:t>
-            </a:r>
-            <a:r>
-              <a:rPr lang="en-US" dirty="0" smtClean="0">
-                <a:latin typeface="Courier New" panose="02070309020205020404" pitchFamily="49" charset="0"/>
-                <a:cs typeface="Courier New" panose="02070309020205020404" pitchFamily="49" charset="0"/>
-              </a:rPr>
-              <a:t>&amp;</a:t>
+              <a:t> --exit-on-last &amp;</a:t>
             </a:r>
           </a:p>
           <a:p>
@@ -8433,7 +8402,11 @@
           <a:p>
             <a:r>
               <a:rPr lang="en-US" dirty="0" smtClean="0"/>
-              <a:t>Best practices</a:t>
+              <a:t>MPI + </a:t>
+            </a:r>
+            <a:r>
+              <a:rPr lang="en-US" dirty="0" err="1" smtClean="0"/>
+              <a:t>OpenMP</a:t>
             </a:r>
             <a:endParaRPr lang="nl-BE" dirty="0"/>
           </a:p>
@@ -8476,6 +8449,571 @@
             <a:fld id="{0E10C2AD-1307-4F27-A6A5-469AD3C2F368}" type="slidenum">
               <a:rPr lang="nl-BE" smtClean="0"/>
               <a:t>20</a:t>
+            </a:fld>
+            <a:endParaRPr lang="nl-BE"/>
+          </a:p>
+        </p:txBody>
+      </p:sp>
+    </p:spTree>
+    <p:extLst>
+      <p:ext uri="{BB962C8B-B14F-4D97-AF65-F5344CB8AC3E}">
+        <p14:creationId xmlns:p14="http://schemas.microsoft.com/office/powerpoint/2010/main" val="2913503156"/>
+      </p:ext>
+    </p:extLst>
+  </p:cSld>
+  <p:clrMapOvr>
+    <a:masterClrMapping/>
+  </p:clrMapOvr>
+</p:sld>
+</file>
+
+<file path=ppt/slides/slide21.xml><?xml version="1.0" encoding="utf-8"?>
+<p:sld xmlns:a="http://schemas.openxmlformats.org/drawingml/2006/main" xmlns:r="http://schemas.openxmlformats.org/officeDocument/2006/relationships" xmlns:p="http://schemas.openxmlformats.org/presentationml/2006/main">
+  <p:cSld>
+    <p:spTree>
+      <p:nvGrpSpPr>
+        <p:cNvPr id="1" name=""/>
+        <p:cNvGrpSpPr/>
+        <p:nvPr/>
+      </p:nvGrpSpPr>
+      <p:grpSpPr>
+        <a:xfrm>
+          <a:off x="0" y="0"/>
+          <a:ext cx="0" cy="0"/>
+          <a:chOff x="0" y="0"/>
+          <a:chExt cx="0" cy="0"/>
+        </a:xfrm>
+      </p:grpSpPr>
+      <p:sp>
+        <p:nvSpPr>
+          <p:cNvPr id="2" name="Title 1"/>
+          <p:cNvSpPr>
+            <a:spLocks noGrp="1"/>
+          </p:cNvSpPr>
+          <p:nvPr>
+            <p:ph type="title"/>
+          </p:nvPr>
+        </p:nvSpPr>
+        <p:spPr/>
+        <p:txBody>
+          <a:bodyPr/>
+          <a:lstStyle/>
+          <a:p>
+            <a:r>
+              <a:rPr lang="en-US" dirty="0" smtClean="0"/>
+              <a:t>Single-node MPI + </a:t>
+            </a:r>
+            <a:r>
+              <a:rPr lang="en-US" dirty="0" err="1" smtClean="0"/>
+              <a:t>OpenMP</a:t>
+            </a:r>
+            <a:endParaRPr lang="nl-BE" dirty="0"/>
+          </a:p>
+        </p:txBody>
+      </p:sp>
+      <p:sp>
+        <p:nvSpPr>
+          <p:cNvPr id="3" name="Content Placeholder 2"/>
+          <p:cNvSpPr>
+            <a:spLocks noGrp="1"/>
+          </p:cNvSpPr>
+          <p:nvPr>
+            <p:ph idx="1"/>
+          </p:nvPr>
+        </p:nvSpPr>
+        <p:spPr/>
+        <p:txBody>
+          <a:bodyPr/>
+          <a:lstStyle/>
+          <a:p>
+            <a:r>
+              <a:rPr lang="en-US" dirty="0" smtClean="0"/>
+              <a:t>PBS script</a:t>
+            </a:r>
+          </a:p>
+          <a:p>
+            <a:pPr lvl="1"/>
+            <a:r>
+              <a:rPr lang="en-US" dirty="0" smtClean="0"/>
+              <a:t>Start DMTCP coordinator</a:t>
+            </a:r>
+          </a:p>
+          <a:p>
+            <a:pPr lvl="1"/>
+            <a:r>
+              <a:rPr lang="en-US" dirty="0" smtClean="0"/>
+              <a:t>Run application</a:t>
+            </a:r>
+            <a:endParaRPr lang="nl-BE" dirty="0"/>
+          </a:p>
+        </p:txBody>
+      </p:sp>
+      <p:sp>
+        <p:nvSpPr>
+          <p:cNvPr id="4" name="Slide Number Placeholder 3"/>
+          <p:cNvSpPr>
+            <a:spLocks noGrp="1"/>
+          </p:cNvSpPr>
+          <p:nvPr>
+            <p:ph type="sldNum" sz="quarter" idx="12"/>
+          </p:nvPr>
+        </p:nvSpPr>
+        <p:spPr/>
+        <p:txBody>
+          <a:bodyPr/>
+          <a:lstStyle/>
+          <a:p>
+            <a:fld id="{0E10C2AD-1307-4F27-A6A5-469AD3C2F368}" type="slidenum">
+              <a:rPr lang="nl-BE" smtClean="0"/>
+              <a:t>21</a:t>
+            </a:fld>
+            <a:endParaRPr lang="nl-BE"/>
+          </a:p>
+        </p:txBody>
+      </p:sp>
+      <p:sp>
+        <p:nvSpPr>
+          <p:cNvPr id="5" name="Rectangle 4"/>
+          <p:cNvSpPr/>
+          <p:nvPr/>
+        </p:nvSpPr>
+        <p:spPr>
+          <a:xfrm>
+            <a:off x="912243" y="3157179"/>
+            <a:ext cx="6574407" cy="2308324"/>
+          </a:xfrm>
+          <a:prstGeom prst="rect">
+            <a:avLst/>
+          </a:prstGeom>
+          <a:solidFill>
+            <a:schemeClr val="bg1">
+              <a:lumMod val="85000"/>
+            </a:schemeClr>
+          </a:solidFill>
+          <a:ln>
+            <a:solidFill>
+              <a:schemeClr val="tx1"/>
+            </a:solidFill>
+          </a:ln>
+        </p:spPr>
+        <p:txBody>
+          <a:bodyPr wrap="square">
+            <a:spAutoFit/>
+          </a:bodyPr>
+          <a:lstStyle/>
+          <a:p>
+            <a:r>
+              <a:rPr lang="nl-BE" dirty="0" smtClean="0">
+                <a:latin typeface="Courier New" panose="02070309020205020404" pitchFamily="49" charset="0"/>
+                <a:cs typeface="Courier New" panose="02070309020205020404" pitchFamily="49" charset="0"/>
+              </a:rPr>
+              <a:t>#!/bin/</a:t>
+            </a:r>
+            <a:r>
+              <a:rPr lang="nl-BE" dirty="0" err="1" smtClean="0">
+                <a:latin typeface="Courier New" panose="02070309020205020404" pitchFamily="49" charset="0"/>
+                <a:cs typeface="Courier New" panose="02070309020205020404" pitchFamily="49" charset="0"/>
+              </a:rPr>
+              <a:t>bash</a:t>
+            </a:r>
+            <a:endParaRPr lang="nl-BE" dirty="0" smtClean="0">
+              <a:latin typeface="Courier New" panose="02070309020205020404" pitchFamily="49" charset="0"/>
+              <a:cs typeface="Courier New" panose="02070309020205020404" pitchFamily="49" charset="0"/>
+            </a:endParaRPr>
+          </a:p>
+          <a:p>
+            <a:r>
+              <a:rPr lang="nl-BE" dirty="0" smtClean="0">
+                <a:latin typeface="Courier New" panose="02070309020205020404" pitchFamily="49" charset="0"/>
+                <a:cs typeface="Courier New" panose="02070309020205020404" pitchFamily="49" charset="0"/>
+              </a:rPr>
+              <a:t>#PBS -l </a:t>
+            </a:r>
+            <a:r>
+              <a:rPr lang="nl-BE" dirty="0" err="1" smtClean="0">
+                <a:latin typeface="Courier New" panose="02070309020205020404" pitchFamily="49" charset="0"/>
+                <a:cs typeface="Courier New" panose="02070309020205020404" pitchFamily="49" charset="0"/>
+              </a:rPr>
+              <a:t>nodes</a:t>
+            </a:r>
+            <a:r>
+              <a:rPr lang="nl-BE" dirty="0" smtClean="0">
+                <a:latin typeface="Courier New" panose="02070309020205020404" pitchFamily="49" charset="0"/>
+                <a:cs typeface="Courier New" panose="02070309020205020404" pitchFamily="49" charset="0"/>
+              </a:rPr>
+              <a:t>=1:ppn=4</a:t>
+            </a:r>
+            <a:endParaRPr lang="nl-BE" dirty="0" smtClean="0">
+              <a:latin typeface="Courier New" panose="02070309020205020404" pitchFamily="49" charset="0"/>
+              <a:cs typeface="Courier New" panose="02070309020205020404" pitchFamily="49" charset="0"/>
+            </a:endParaRPr>
+          </a:p>
+          <a:p>
+            <a:r>
+              <a:rPr lang="en-US" dirty="0" smtClean="0">
+                <a:latin typeface="Courier New" panose="02070309020205020404" pitchFamily="49" charset="0"/>
+                <a:cs typeface="Courier New" panose="02070309020205020404" pitchFamily="49" charset="0"/>
+              </a:rPr>
+              <a:t>…</a:t>
+            </a:r>
+          </a:p>
+          <a:p>
+            <a:r>
+              <a:rPr lang="en-US" dirty="0" smtClean="0">
+                <a:latin typeface="Courier New" panose="02070309020205020404" pitchFamily="49" charset="0"/>
+                <a:cs typeface="Courier New" panose="02070309020205020404" pitchFamily="49" charset="0"/>
+              </a:rPr>
+              <a:t>export OMP_NUM_THREADS=2</a:t>
+            </a:r>
+            <a:endParaRPr lang="en-US" dirty="0" smtClean="0">
+              <a:latin typeface="Courier New" panose="02070309020205020404" pitchFamily="49" charset="0"/>
+              <a:cs typeface="Courier New" panose="02070309020205020404" pitchFamily="49" charset="0"/>
+            </a:endParaRPr>
+          </a:p>
+          <a:p>
+            <a:r>
+              <a:rPr lang="en-US" dirty="0" err="1" smtClean="0">
+                <a:latin typeface="Courier New" panose="02070309020205020404" pitchFamily="49" charset="0"/>
+                <a:cs typeface="Courier New" panose="02070309020205020404" pitchFamily="49" charset="0"/>
+              </a:rPr>
+              <a:t>dmtcp_launch</a:t>
+            </a:r>
+            <a:r>
+              <a:rPr lang="en-US" dirty="0" smtClean="0">
+                <a:latin typeface="Courier New" panose="02070309020205020404" pitchFamily="49" charset="0"/>
+                <a:cs typeface="Courier New" panose="02070309020205020404" pitchFamily="49" charset="0"/>
+              </a:rPr>
+              <a:t>  --</a:t>
+            </a:r>
+            <a:r>
+              <a:rPr lang="en-US" dirty="0" err="1" smtClean="0">
+                <a:latin typeface="Courier New" panose="02070309020205020404" pitchFamily="49" charset="0"/>
+                <a:cs typeface="Courier New" panose="02070309020205020404" pitchFamily="49" charset="0"/>
+              </a:rPr>
+              <a:t>ib</a:t>
+            </a:r>
+            <a:r>
+              <a:rPr lang="en-US" dirty="0" smtClean="0">
+                <a:latin typeface="Courier New" panose="02070309020205020404" pitchFamily="49" charset="0"/>
+                <a:cs typeface="Courier New" panose="02070309020205020404" pitchFamily="49" charset="0"/>
+              </a:rPr>
+              <a:t>  \</a:t>
+            </a:r>
+          </a:p>
+          <a:p>
+            <a:r>
+              <a:rPr lang="en-US" dirty="0" smtClean="0">
+                <a:latin typeface="Courier New" panose="02070309020205020404" pitchFamily="49" charset="0"/>
+                <a:cs typeface="Courier New" panose="02070309020205020404" pitchFamily="49" charset="0"/>
+              </a:rPr>
+              <a:t>    </a:t>
+            </a:r>
+            <a:r>
+              <a:rPr lang="en-US" dirty="0" err="1" smtClean="0">
+                <a:latin typeface="Courier New" panose="02070309020205020404" pitchFamily="49" charset="0"/>
+                <a:cs typeface="Courier New" panose="02070309020205020404" pitchFamily="49" charset="0"/>
+              </a:rPr>
+              <a:t>mpirun</a:t>
+            </a:r>
+            <a:r>
+              <a:rPr lang="en-US" dirty="0" smtClean="0">
+                <a:latin typeface="Courier New" panose="02070309020205020404" pitchFamily="49" charset="0"/>
+                <a:cs typeface="Courier New" panose="02070309020205020404" pitchFamily="49" charset="0"/>
+              </a:rPr>
+              <a:t>  --map-by ppr:2:socket:PE=2 \</a:t>
+            </a:r>
+          </a:p>
+          <a:p>
+            <a:r>
+              <a:rPr lang="en-US" dirty="0">
+                <a:latin typeface="Courier New" panose="02070309020205020404" pitchFamily="49" charset="0"/>
+                <a:cs typeface="Courier New" panose="02070309020205020404" pitchFamily="49" charset="0"/>
+              </a:rPr>
+              <a:t> </a:t>
+            </a:r>
+            <a:r>
+              <a:rPr lang="en-US" dirty="0" smtClean="0">
+                <a:latin typeface="Courier New" panose="02070309020205020404" pitchFamily="49" charset="0"/>
+                <a:cs typeface="Courier New" panose="02070309020205020404" pitchFamily="49" charset="0"/>
+              </a:rPr>
+              <a:t>       ./pi.exe 1000000000</a:t>
+            </a:r>
+          </a:p>
+          <a:p>
+            <a:r>
+              <a:rPr lang="en-US" dirty="0" smtClean="0">
+                <a:latin typeface="Courier New" panose="02070309020205020404" pitchFamily="49" charset="0"/>
+                <a:cs typeface="Courier New" panose="02070309020205020404" pitchFamily="49" charset="0"/>
+              </a:rPr>
+              <a:t>…</a:t>
+            </a:r>
+            <a:endParaRPr lang="nl-BE" dirty="0" smtClean="0">
+              <a:latin typeface="Courier New" panose="02070309020205020404" pitchFamily="49" charset="0"/>
+              <a:cs typeface="Courier New" panose="02070309020205020404" pitchFamily="49" charset="0"/>
+            </a:endParaRPr>
+          </a:p>
+        </p:txBody>
+      </p:sp>
+      <p:grpSp>
+        <p:nvGrpSpPr>
+          <p:cNvPr id="6" name="Group 5"/>
+          <p:cNvGrpSpPr/>
+          <p:nvPr/>
+        </p:nvGrpSpPr>
+        <p:grpSpPr>
+          <a:xfrm>
+            <a:off x="4172324" y="4856672"/>
+            <a:ext cx="4571251" cy="1108706"/>
+            <a:chOff x="810883" y="4022904"/>
+            <a:chExt cx="4571251" cy="1108706"/>
+          </a:xfrm>
+        </p:grpSpPr>
+        <p:sp>
+          <p:nvSpPr>
+            <p:cNvPr id="7" name="TextBox 6"/>
+            <p:cNvSpPr txBox="1"/>
+            <p:nvPr/>
+          </p:nvSpPr>
+          <p:spPr>
+            <a:xfrm>
+              <a:off x="810883" y="4762278"/>
+              <a:ext cx="4571251" cy="369332"/>
+            </a:xfrm>
+            <a:prstGeom prst="rect">
+              <a:avLst/>
+            </a:prstGeom>
+            <a:noFill/>
+            <a:ln>
+              <a:solidFill>
+                <a:schemeClr val="tx1"/>
+              </a:solidFill>
+            </a:ln>
+          </p:spPr>
+          <p:txBody>
+            <a:bodyPr wrap="none" rtlCol="0">
+              <a:spAutoFit/>
+            </a:bodyPr>
+            <a:lstStyle/>
+            <a:p>
+              <a:r>
+                <a:rPr lang="en-US" dirty="0" err="1" smtClean="0"/>
+                <a:t>OpenMPI</a:t>
+              </a:r>
+              <a:r>
+                <a:rPr lang="en-US" dirty="0" smtClean="0"/>
+                <a:t> 1.8.x: 2 processes, 2 threads/process</a:t>
+              </a:r>
+              <a:endParaRPr lang="nl-BE" dirty="0">
+                <a:latin typeface="Courier New" panose="02070309020205020404" pitchFamily="49" charset="0"/>
+                <a:cs typeface="Courier New" panose="02070309020205020404" pitchFamily="49" charset="0"/>
+              </a:endParaRPr>
+            </a:p>
+          </p:txBody>
+        </p:sp>
+        <p:cxnSp>
+          <p:nvCxnSpPr>
+            <p:cNvPr id="8" name="Straight Arrow Connector 7"/>
+            <p:cNvCxnSpPr>
+              <a:stCxn id="7" idx="0"/>
+            </p:cNvCxnSpPr>
+            <p:nvPr/>
+          </p:nvCxnSpPr>
+          <p:spPr>
+            <a:xfrm flipH="1" flipV="1">
+              <a:off x="2038695" y="4022904"/>
+              <a:ext cx="1057814" cy="739374"/>
+            </a:xfrm>
+            <a:prstGeom prst="straightConnector1">
+              <a:avLst/>
+            </a:prstGeom>
+            <a:ln w="19050">
+              <a:solidFill>
+                <a:schemeClr val="tx1"/>
+              </a:solidFill>
+              <a:tailEnd type="stealth" w="lg" len="lg"/>
+            </a:ln>
+          </p:spPr>
+          <p:style>
+            <a:lnRef idx="1">
+              <a:schemeClr val="accent1"/>
+            </a:lnRef>
+            <a:fillRef idx="0">
+              <a:schemeClr val="accent1"/>
+            </a:fillRef>
+            <a:effectRef idx="0">
+              <a:schemeClr val="accent1"/>
+            </a:effectRef>
+            <a:fontRef idx="minor">
+              <a:schemeClr val="tx1"/>
+            </a:fontRef>
+          </p:style>
+        </p:cxnSp>
+      </p:grpSp>
+    </p:spTree>
+    <p:extLst>
+      <p:ext uri="{BB962C8B-B14F-4D97-AF65-F5344CB8AC3E}">
+        <p14:creationId xmlns:p14="http://schemas.microsoft.com/office/powerpoint/2010/main" val="1030802229"/>
+      </p:ext>
+    </p:extLst>
+  </p:cSld>
+  <p:clrMapOvr>
+    <a:masterClrMapping/>
+  </p:clrMapOvr>
+  <p:timing>
+    <p:tnLst>
+      <p:par>
+        <p:cTn id="1" dur="indefinite" restart="never" nodeType="tmRoot">
+          <p:childTnLst>
+            <p:seq concurrent="1" nextAc="seek">
+              <p:cTn id="2" dur="indefinite" nodeType="mainSeq">
+                <p:childTnLst>
+                  <p:par>
+                    <p:cTn id="3" fill="hold">
+                      <p:stCondLst>
+                        <p:cond delay="indefinite"/>
+                      </p:stCondLst>
+                      <p:childTnLst>
+                        <p:par>
+                          <p:cTn id="4" fill="hold">
+                            <p:stCondLst>
+                              <p:cond delay="0"/>
+                            </p:stCondLst>
+                            <p:childTnLst>
+                              <p:par>
+                                <p:cTn id="5" presetID="1" presetClass="entr" presetSubtype="0" fill="hold" nodeType="clickEffect">
+                                  <p:stCondLst>
+                                    <p:cond delay="0"/>
+                                  </p:stCondLst>
+                                  <p:childTnLst>
+                                    <p:set>
+                                      <p:cBhvr>
+                                        <p:cTn id="6" dur="1" fill="hold">
+                                          <p:stCondLst>
+                                            <p:cond delay="0"/>
+                                          </p:stCondLst>
+                                        </p:cTn>
+                                        <p:tgtEl>
+                                          <p:spTgt spid="6"/>
+                                        </p:tgtEl>
+                                        <p:attrNameLst>
+                                          <p:attrName>style.visibility</p:attrName>
+                                        </p:attrNameLst>
+                                      </p:cBhvr>
+                                      <p:to>
+                                        <p:strVal val="visible"/>
+                                      </p:to>
+                                    </p:set>
+                                  </p:childTnLst>
+                                </p:cTn>
+                              </p:par>
+                            </p:childTnLst>
+                          </p:cTn>
+                        </p:par>
+                      </p:childTnLst>
+                    </p:cTn>
+                  </p:par>
+                </p:childTnLst>
+              </p:cTn>
+              <p:prevCondLst>
+                <p:cond evt="onPrev" delay="0">
+                  <p:tgtEl>
+                    <p:sldTgt/>
+                  </p:tgtEl>
+                </p:cond>
+              </p:prevCondLst>
+              <p:nextCondLst>
+                <p:cond evt="onNext" delay="0">
+                  <p:tgtEl>
+                    <p:sldTgt/>
+                  </p:tgtEl>
+                </p:cond>
+              </p:nextCondLst>
+            </p:seq>
+          </p:childTnLst>
+        </p:cTn>
+      </p:par>
+    </p:tnLst>
+  </p:timing>
+</p:sld>
+</file>
+
+<file path=ppt/slides/slide22.xml><?xml version="1.0" encoding="utf-8"?>
+<p:sld xmlns:a="http://schemas.openxmlformats.org/drawingml/2006/main" xmlns:r="http://schemas.openxmlformats.org/officeDocument/2006/relationships" xmlns:p="http://schemas.openxmlformats.org/presentationml/2006/main">
+  <p:cSld>
+    <p:spTree>
+      <p:nvGrpSpPr>
+        <p:cNvPr id="1" name=""/>
+        <p:cNvGrpSpPr/>
+        <p:nvPr/>
+      </p:nvGrpSpPr>
+      <p:grpSpPr>
+        <a:xfrm>
+          <a:off x="0" y="0"/>
+          <a:ext cx="0" cy="0"/>
+          <a:chOff x="0" y="0"/>
+          <a:chExt cx="0" cy="0"/>
+        </a:xfrm>
+      </p:grpSpPr>
+      <p:sp>
+        <p:nvSpPr>
+          <p:cNvPr id="2" name="Title 1"/>
+          <p:cNvSpPr>
+            <a:spLocks noGrp="1"/>
+          </p:cNvSpPr>
+          <p:nvPr>
+            <p:ph type="title"/>
+          </p:nvPr>
+        </p:nvSpPr>
+        <p:spPr/>
+        <p:txBody>
+          <a:bodyPr/>
+          <a:lstStyle/>
+          <a:p>
+            <a:r>
+              <a:rPr lang="en-US" dirty="0" smtClean="0"/>
+              <a:t>Best practices</a:t>
+            </a:r>
+            <a:endParaRPr lang="nl-BE" dirty="0"/>
+          </a:p>
+        </p:txBody>
+      </p:sp>
+      <p:sp>
+        <p:nvSpPr>
+          <p:cNvPr id="3" name="Text Placeholder 2"/>
+          <p:cNvSpPr>
+            <a:spLocks noGrp="1"/>
+          </p:cNvSpPr>
+          <p:nvPr>
+            <p:ph type="body" idx="1"/>
+          </p:nvPr>
+        </p:nvSpPr>
+        <p:spPr/>
+        <p:txBody>
+          <a:bodyPr/>
+          <a:lstStyle/>
+          <a:p>
+            <a:endParaRPr lang="nl-BE"/>
+          </a:p>
+        </p:txBody>
+      </p:sp>
+      <p:sp>
+        <p:nvSpPr>
+          <p:cNvPr id="4" name="Slide Number Placeholder 3"/>
+          <p:cNvSpPr>
+            <a:spLocks noGrp="1"/>
+          </p:cNvSpPr>
+          <p:nvPr>
+            <p:ph type="sldNum" sz="quarter" idx="12"/>
+          </p:nvPr>
+        </p:nvSpPr>
+        <p:spPr/>
+        <p:txBody>
+          <a:bodyPr/>
+          <a:lstStyle/>
+          <a:p>
+            <a:fld id="{0E10C2AD-1307-4F27-A6A5-469AD3C2F368}" type="slidenum">
+              <a:rPr lang="nl-BE" smtClean="0"/>
+              <a:t>22</a:t>
             </a:fld>
             <a:endParaRPr lang="nl-BE"/>
           </a:p>
@@ -8501,7 +9039,7 @@
 </p:sld>
 </file>
 
-<file path=ppt/slides/slide21.xml><?xml version="1.0" encoding="utf-8"?>
+<file path=ppt/slides/slide23.xml><?xml version="1.0" encoding="utf-8"?>
 <p:sld xmlns:a="http://schemas.openxmlformats.org/drawingml/2006/main" xmlns:r="http://schemas.openxmlformats.org/officeDocument/2006/relationships" xmlns:p="http://schemas.openxmlformats.org/presentationml/2006/main">
   <p:cSld>
     <p:spTree>
@@ -8622,7 +9160,7 @@
           <a:p>
             <a:fld id="{0E10C2AD-1307-4F27-A6A5-469AD3C2F368}" type="slidenum">
               <a:rPr lang="nl-BE" smtClean="0"/>
-              <a:t>21</a:t>
+              <a:t>23</a:t>
             </a:fld>
             <a:endParaRPr lang="nl-BE"/>
           </a:p>
@@ -10398,11 +10936,7 @@
           <a:p>
             <a:r>
               <a:rPr lang="en-US" dirty="0" smtClean="0"/>
-              <a:t>How often to checkpoint</a:t>
-            </a:r>
-            <a:r>
-              <a:rPr lang="en-US" dirty="0" smtClean="0"/>
-              <a:t>?</a:t>
+              <a:t>How often to checkpoint?</a:t>
             </a:r>
           </a:p>
           <a:p>
@@ -10842,33 +11376,22 @@
                 <a:latin typeface="Courier New" panose="02070309020205020404" pitchFamily="49" charset="0"/>
                 <a:cs typeface="Courier New" panose="02070309020205020404" pitchFamily="49" charset="0"/>
               </a:rPr>
-              <a:t>export </a:t>
+              <a:t>export DMTCP_COORD_HOST=$(</a:t>
+            </a:r>
+            <a:r>
+              <a:rPr lang="nl-BE" dirty="0" err="1" smtClean="0">
+                <a:latin typeface="Courier New" panose="02070309020205020404" pitchFamily="49" charset="0"/>
+                <a:cs typeface="Courier New" panose="02070309020205020404" pitchFamily="49" charset="0"/>
+              </a:rPr>
+              <a:t>hostname</a:t>
             </a:r>
             <a:r>
               <a:rPr lang="nl-BE" dirty="0" smtClean="0">
                 <a:latin typeface="Courier New" panose="02070309020205020404" pitchFamily="49" charset="0"/>
                 <a:cs typeface="Courier New" panose="02070309020205020404" pitchFamily="49" charset="0"/>
               </a:rPr>
-              <a:t>DMTCP_COORD_HOST=$(</a:t>
-            </a:r>
-            <a:r>
-              <a:rPr lang="nl-BE" dirty="0" err="1" smtClean="0">
-                <a:latin typeface="Courier New" panose="02070309020205020404" pitchFamily="49" charset="0"/>
-                <a:cs typeface="Courier New" panose="02070309020205020404" pitchFamily="49" charset="0"/>
-              </a:rPr>
-              <a:t>hostname</a:t>
-            </a:r>
-            <a:r>
-              <a:rPr lang="nl-BE" dirty="0" smtClean="0">
-                <a:latin typeface="Courier New" panose="02070309020205020404" pitchFamily="49" charset="0"/>
-                <a:cs typeface="Courier New" panose="02070309020205020404" pitchFamily="49" charset="0"/>
-              </a:rPr>
               <a:t>)</a:t>
             </a:r>
-            <a:endParaRPr lang="nl-BE" dirty="0" smtClean="0">
-              <a:latin typeface="Courier New" panose="02070309020205020404" pitchFamily="49" charset="0"/>
-              <a:cs typeface="Courier New" panose="02070309020205020404" pitchFamily="49" charset="0"/>
-            </a:endParaRPr>
           </a:p>
         </p:txBody>
       </p:sp>
@@ -11616,14 +12139,7 @@
                 <a:latin typeface="Courier New" panose="02070309020205020404" pitchFamily="49" charset="0"/>
                 <a:cs typeface="Courier New" panose="02070309020205020404" pitchFamily="49" charset="0"/>
               </a:rPr>
-              <a:t>--</a:t>
-            </a:r>
-            <a:r>
-              <a:rPr lang="nl-BE" dirty="0" smtClean="0">
-                <a:latin typeface="Courier New" panose="02070309020205020404" pitchFamily="49" charset="0"/>
-                <a:cs typeface="Courier New" panose="02070309020205020404" pitchFamily="49" charset="0"/>
-              </a:rPr>
-              <a:t>exit-on-last &amp;</a:t>
+              <a:t>--exit-on-last &amp;</a:t>
             </a:r>
             <a:endParaRPr lang="nl-BE" dirty="0">
               <a:latin typeface="Courier New" panose="02070309020205020404" pitchFamily="49" charset="0"/>

</xml_diff>